<commit_message>
Data Transfers - Part 2
</commit_message>
<xml_diff>
--- a/04 Data Transfers/Data Transfers - Part 1.pptx
+++ b/04 Data Transfers/Data Transfers - Part 1.pptx
@@ -6609,7 +6609,7 @@
                 <a:ea typeface="Tahoma" panose="020B0604030504040204" pitchFamily="34" charset="0"/>
                 <a:cs typeface="Tahoma" panose="020B0604030504040204" pitchFamily="34" charset="0"/>
               </a:rPr>
-              <a:t>Even-odd</a:t>
+              <a:t>DATA TRANSFERS – PART 1</a:t>
             </a:r>
           </a:p>
           <a:p>
@@ -6632,7 +6632,7 @@
                 <a:ea typeface="Tahoma" panose="020B0604030504040204" pitchFamily="34" charset="0"/>
                 <a:cs typeface="Tahoma" panose="020B0604030504040204" pitchFamily="34" charset="0"/>
               </a:rPr>
-              <a:t>https://github.com/shankar-ray/Assembly-Language-Tutorials-for-Windows/tree/master/03%20Assembly%20Language</a:t>
+              <a:t>https://github.com/shankar-ray/Assembly-Language-Tutorials-for-Windows/blob/master/04%20Data%20Transfers/Data%20Transfers%20-%20Part%201/Data%20Transfers%20-%20Part%201/Source.asm</a:t>
             </a:r>
           </a:p>
         </p:txBody>

</xml_diff>

<commit_message>
Data Transfers - Part 3
</commit_message>
<xml_diff>
--- a/04 Data Transfers/Data Transfers - Part 1.pptx
+++ b/04 Data Transfers/Data Transfers - Part 1.pptx
@@ -6624,7 +6624,7 @@
           </a:p>
           <a:p>
             <a:r>
-              <a:rPr lang="en-US" sz="1600" dirty="0">
+              <a:rPr lang="en-US" sz="1600">
                 <a:solidFill>
                   <a:schemeClr val="tx2"/>
                 </a:solidFill>
@@ -6632,8 +6632,16 @@
                 <a:ea typeface="Tahoma" panose="020B0604030504040204" pitchFamily="34" charset="0"/>
                 <a:cs typeface="Tahoma" panose="020B0604030504040204" pitchFamily="34" charset="0"/>
               </a:rPr>
-              <a:t>https://github.com/shankar-ray/Assembly-Language-Tutorials-for-Windows/blob/master/04%20Data%20Transfers/Data%20Transfers%20-%20Part%201/Data%20Transfers%20-%20Part%201/Source.asm</a:t>
-            </a:r>
+              <a:t>https://github.com/shankar-ray/Assembly-Language-Tutorials-for-Windows</a:t>
+            </a:r>
+            <a:endParaRPr lang="en-US" sz="1600" dirty="0">
+              <a:solidFill>
+                <a:schemeClr val="tx2"/>
+              </a:solidFill>
+              <a:latin typeface="Tahoma" panose="020B0604030504040204" pitchFamily="34" charset="0"/>
+              <a:ea typeface="Tahoma" panose="020B0604030504040204" pitchFamily="34" charset="0"/>
+              <a:cs typeface="Tahoma" panose="020B0604030504040204" pitchFamily="34" charset="0"/>
+            </a:endParaRPr>
           </a:p>
         </p:txBody>
       </p:sp>

</xml_diff>

<commit_message>
removed videos from repo
</commit_message>
<xml_diff>
--- a/04 Data Transfers/Data Transfers - Part 1.pptx
+++ b/04 Data Transfers/Data Transfers - Part 1.pptx
@@ -205,7 +205,7 @@
           <a:p>
             <a:fld id="{E8DC62A2-CA51-4DE6-9EB4-2B31184897F4}" type="datetimeFigureOut">
               <a:rPr lang="en-US" smtClean="0"/>
-              <a:t>3/25/2018</a:t>
+              <a:t>3/26/2018</a:t>
             </a:fld>
             <a:endParaRPr lang="en-US"/>
           </a:p>
@@ -698,7 +698,7 @@
           <a:p>
             <a:fld id="{C619A8D2-2616-4635-9C0D-88FB85C3F02D}" type="datetimeFigureOut">
               <a:rPr lang="en-US" smtClean="0"/>
-              <a:t>3/25/2018</a:t>
+              <a:t>3/26/2018</a:t>
             </a:fld>
             <a:endParaRPr lang="en-US"/>
           </a:p>
@@ -906,7 +906,7 @@
           <a:p>
             <a:fld id="{C619A8D2-2616-4635-9C0D-88FB85C3F02D}" type="datetimeFigureOut">
               <a:rPr lang="en-US" smtClean="0"/>
-              <a:t>3/25/2018</a:t>
+              <a:t>3/26/2018</a:t>
             </a:fld>
             <a:endParaRPr lang="en-US"/>
           </a:p>
@@ -1162,7 +1162,7 @@
           <a:p>
             <a:fld id="{C619A8D2-2616-4635-9C0D-88FB85C3F02D}" type="datetimeFigureOut">
               <a:rPr lang="en-US" smtClean="0"/>
-              <a:t>3/25/2018</a:t>
+              <a:t>3/26/2018</a:t>
             </a:fld>
             <a:endParaRPr lang="en-US"/>
           </a:p>
@@ -1336,7 +1336,7 @@
           <a:p>
             <a:fld id="{C619A8D2-2616-4635-9C0D-88FB85C3F02D}" type="datetimeFigureOut">
               <a:rPr lang="en-US" smtClean="0"/>
-              <a:t>3/25/2018</a:t>
+              <a:t>3/26/2018</a:t>
             </a:fld>
             <a:endParaRPr lang="en-US"/>
           </a:p>
@@ -1679,7 +1679,7 @@
           <a:p>
             <a:fld id="{C619A8D2-2616-4635-9C0D-88FB85C3F02D}" type="datetimeFigureOut">
               <a:rPr lang="en-US" smtClean="0"/>
-              <a:t>3/25/2018</a:t>
+              <a:t>3/26/2018</a:t>
             </a:fld>
             <a:endParaRPr lang="en-US"/>
           </a:p>
@@ -1954,7 +1954,7 @@
           <a:p>
             <a:fld id="{C619A8D2-2616-4635-9C0D-88FB85C3F02D}" type="datetimeFigureOut">
               <a:rPr lang="en-US" smtClean="0"/>
-              <a:t>3/25/2018</a:t>
+              <a:t>3/26/2018</a:t>
             </a:fld>
             <a:endParaRPr lang="en-US"/>
           </a:p>
@@ -2338,7 +2338,7 @@
           <a:p>
             <a:fld id="{C619A8D2-2616-4635-9C0D-88FB85C3F02D}" type="datetimeFigureOut">
               <a:rPr lang="en-US" smtClean="0"/>
-              <a:t>3/25/2018</a:t>
+              <a:t>3/26/2018</a:t>
             </a:fld>
             <a:endParaRPr lang="en-US"/>
           </a:p>
@@ -2461,7 +2461,7 @@
           <a:p>
             <a:fld id="{C619A8D2-2616-4635-9C0D-88FB85C3F02D}" type="datetimeFigureOut">
               <a:rPr lang="en-US" smtClean="0"/>
-              <a:t>3/25/2018</a:t>
+              <a:t>3/26/2018</a:t>
             </a:fld>
             <a:endParaRPr lang="en-US"/>
           </a:p>
@@ -2632,7 +2632,7 @@
           <a:p>
             <a:fld id="{C619A8D2-2616-4635-9C0D-88FB85C3F02D}" type="datetimeFigureOut">
               <a:rPr lang="en-US" smtClean="0"/>
-              <a:t>3/25/2018</a:t>
+              <a:t>3/26/2018</a:t>
             </a:fld>
             <a:endParaRPr lang="en-US"/>
           </a:p>
@@ -2986,7 +2986,7 @@
           <a:p>
             <a:fld id="{C619A8D2-2616-4635-9C0D-88FB85C3F02D}" type="datetimeFigureOut">
               <a:rPr lang="en-US" smtClean="0"/>
-              <a:t>3/25/2018</a:t>
+              <a:t>3/26/2018</a:t>
             </a:fld>
             <a:endParaRPr lang="en-US"/>
           </a:p>
@@ -3373,7 +3373,7 @@
           <a:p>
             <a:fld id="{C619A8D2-2616-4635-9C0D-88FB85C3F02D}" type="datetimeFigureOut">
               <a:rPr lang="en-US" smtClean="0"/>
-              <a:t>3/25/2018</a:t>
+              <a:t>3/26/2018</a:t>
             </a:fld>
             <a:endParaRPr lang="en-US"/>
           </a:p>
@@ -3660,7 +3660,7 @@
           <a:p>
             <a:fld id="{C619A8D2-2616-4635-9C0D-88FB85C3F02D}" type="datetimeFigureOut">
               <a:rPr lang="en-US" smtClean="0"/>
-              <a:t>3/25/2018</a:t>
+              <a:t>3/26/2018</a:t>
             </a:fld>
             <a:endParaRPr lang="en-US"/>
           </a:p>
@@ -5980,7 +5980,7 @@
                 <a:ea typeface="Tahoma" panose="020B0604030504040204" pitchFamily="34" charset="0"/>
                 <a:cs typeface="Tahoma" panose="020B0604030504040204" pitchFamily="34" charset="0"/>
               </a:rPr>
-              <a:t>MOV REGISTER, REGISTER	//MOV EAX, EBX</a:t>
+              <a:t>XCHG REGISTER, REGISTER	//MOV EAX, EBX</a:t>
             </a:r>
           </a:p>
           <a:p>
@@ -5994,7 +5994,7 @@
                 <a:ea typeface="Tahoma" panose="020B0604030504040204" pitchFamily="34" charset="0"/>
                 <a:cs typeface="Tahoma" panose="020B0604030504040204" pitchFamily="34" charset="0"/>
               </a:rPr>
-              <a:t>MOV MEMORY, REGISTER	//MOV NUM1, EAX</a:t>
+              <a:t>XCHG MEMORY, REGISTER	//MOV NUM1, EAX</a:t>
             </a:r>
           </a:p>
           <a:p>
@@ -6008,7 +6008,7 @@
                 <a:ea typeface="Tahoma" panose="020B0604030504040204" pitchFamily="34" charset="0"/>
                 <a:cs typeface="Tahoma" panose="020B0604030504040204" pitchFamily="34" charset="0"/>
               </a:rPr>
-              <a:t>MOV REGISTER, MEMORY	//MOV EAX, NUM1</a:t>
+              <a:t>XCHG REGISTER, MEMORY	//MOV EAX, NUM1</a:t>
             </a:r>
           </a:p>
           <a:p>
@@ -6025,7 +6025,7 @@
                 <a:ea typeface="Tahoma" panose="020B0604030504040204" pitchFamily="34" charset="0"/>
                 <a:cs typeface="Tahoma" panose="020B0604030504040204" pitchFamily="34" charset="0"/>
               </a:rPr>
-              <a:t>MOV MEMORY, VALUE	</a:t>
+              <a:t>XCHG MEMORY, VALUE	</a:t>
             </a:r>
             <a:r>
               <a:rPr lang="en-US" sz="1400" dirty="0">
@@ -6061,7 +6061,7 @@
                 <a:ea typeface="Tahoma" panose="020B0604030504040204" pitchFamily="34" charset="0"/>
                 <a:cs typeface="Tahoma" panose="020B0604030504040204" pitchFamily="34" charset="0"/>
               </a:rPr>
-              <a:t>MOV REGISTER, VALUE</a:t>
+              <a:t>XCHG REGISTER, VALUE</a:t>
             </a:r>
             <a:r>
               <a:rPr lang="en-US" sz="1400" dirty="0">

</xml_diff>